<commit_message>
Apresentação e Parametros da Simulacao
</commit_message>
<xml_diff>
--- a/Trabalho Netlogo.pptx
+++ b/Trabalho Netlogo.pptx
@@ -11,7 +11,15 @@
     <p:sldId id="258" r:id="rId5"/>
     <p:sldId id="259" r:id="rId6"/>
     <p:sldId id="260" r:id="rId7"/>
-    <p:sldId id="262" r:id="rId8"/>
+    <p:sldId id="264" r:id="rId8"/>
+    <p:sldId id="262" r:id="rId9"/>
+    <p:sldId id="265" r:id="rId10"/>
+    <p:sldId id="266" r:id="rId11"/>
+    <p:sldId id="263" r:id="rId12"/>
+    <p:sldId id="267" r:id="rId13"/>
+    <p:sldId id="268" r:id="rId14"/>
+    <p:sldId id="269" r:id="rId15"/>
+    <p:sldId id="271" r:id="rId16"/>
   </p:sldIdLst>
   <p:sldSz cx="12192000" cy="6858000"/>
   <p:notesSz cx="6858000" cy="9144000"/>
@@ -116,6 +124,18 @@
     </p:ext>
   </p:extLst>
 </p:presentation>
+</file>
+
+<file path=ppt/commentAuthors.xml><?xml version="1.0" encoding="utf-8"?>
+<p:cmAuthorLst xmlns:a="http://schemas.openxmlformats.org/drawingml/2006/main" xmlns:r="http://schemas.openxmlformats.org/officeDocument/2006/relationships" xmlns:p="http://schemas.openxmlformats.org/presentationml/2006/main">
+  <p:cmAuthor id="1" name="Mairon PC" initials="MP" lastIdx="1" clrIdx="0">
+    <p:extLst>
+      <p:ext uri="{19B8F6BF-5375-455C-9EA6-DF929625EA0E}">
+        <p15:presenceInfo xmlns:p15="http://schemas.microsoft.com/office/powerpoint/2012/main" userId="Mairon PC" providerId="None"/>
+      </p:ext>
+    </p:extLst>
+  </p:cmAuthor>
+</p:cmAuthorLst>
 </file>
 
 <file path=ppt/slideLayouts/slideLayout1.xml><?xml version="1.0" encoding="utf-8"?>
@@ -3065,6 +3085,806 @@
 </p:sld>
 </file>
 
+<file path=ppt/slides/slide10.xml><?xml version="1.0" encoding="utf-8"?>
+<p:sld xmlns:a="http://schemas.openxmlformats.org/drawingml/2006/main" xmlns:r="http://schemas.openxmlformats.org/officeDocument/2006/relationships" xmlns:p="http://schemas.openxmlformats.org/presentationml/2006/main">
+  <p:cSld>
+    <p:spTree>
+      <p:nvGrpSpPr>
+        <p:cNvPr id="1" name=""/>
+        <p:cNvGrpSpPr/>
+        <p:nvPr/>
+      </p:nvGrpSpPr>
+      <p:grpSpPr>
+        <a:xfrm>
+          <a:off x="0" y="0"/>
+          <a:ext cx="0" cy="0"/>
+          <a:chOff x="0" y="0"/>
+          <a:chExt cx="0" cy="0"/>
+        </a:xfrm>
+      </p:grpSpPr>
+      <p:sp>
+        <p:nvSpPr>
+          <p:cNvPr id="2" name="Título 1"/>
+          <p:cNvSpPr>
+            <a:spLocks noGrp="1"/>
+          </p:cNvSpPr>
+          <p:nvPr>
+            <p:ph type="title"/>
+          </p:nvPr>
+        </p:nvSpPr>
+        <p:spPr/>
+        <p:txBody>
+          <a:bodyPr/>
+          <a:lstStyle/>
+          <a:p>
+            <a:r>
+              <a:rPr lang="pt-BR" dirty="0"/>
+              <a:t>Extensão do </a:t>
+            </a:r>
+            <a:r>
+              <a:rPr lang="pt-BR" i="1" dirty="0"/>
+              <a:t>Wolf </a:t>
+            </a:r>
+            <a:r>
+              <a:rPr lang="pt-BR" i="1" dirty="0" err="1"/>
+              <a:t>Sheep</a:t>
+            </a:r>
+            <a:r>
+              <a:rPr lang="pt-BR" i="1" dirty="0"/>
+              <a:t> </a:t>
+            </a:r>
+            <a:r>
+              <a:rPr lang="pt-BR" i="1" dirty="0" err="1"/>
+              <a:t>Predation</a:t>
+            </a:r>
+            <a:r>
+              <a:rPr lang="pt-BR" dirty="0"/>
+              <a:t> </a:t>
+            </a:r>
+            <a:r>
+              <a:rPr lang="pt-BR" dirty="0" smtClean="0"/>
+              <a:t>(3)</a:t>
+            </a:r>
+            <a:endParaRPr lang="en-US" dirty="0"/>
+          </a:p>
+        </p:txBody>
+      </p:sp>
+      <p:sp>
+        <p:nvSpPr>
+          <p:cNvPr id="3" name="Espaço Reservado para Conteúdo 2"/>
+          <p:cNvSpPr>
+            <a:spLocks noGrp="1"/>
+          </p:cNvSpPr>
+          <p:nvPr>
+            <p:ph idx="1"/>
+          </p:nvPr>
+        </p:nvSpPr>
+        <p:spPr/>
+        <p:txBody>
+          <a:bodyPr/>
+          <a:lstStyle/>
+          <a:p>
+            <a:pPr algn="just"/>
+            <a:r>
+              <a:rPr lang="en-US" dirty="0" err="1" smtClean="0"/>
+              <a:t>Simulação</a:t>
+            </a:r>
+            <a:endParaRPr lang="en-US" dirty="0" smtClean="0"/>
+          </a:p>
+          <a:p>
+            <a:pPr lvl="1" algn="just"/>
+            <a:r>
+              <a:rPr lang="pt-BR" dirty="0" smtClean="0"/>
+              <a:t>Considera </a:t>
+            </a:r>
+            <a:r>
+              <a:rPr lang="pt-BR" dirty="0"/>
+              <a:t>as estações do </a:t>
+            </a:r>
+            <a:r>
+              <a:rPr lang="pt-BR" dirty="0" smtClean="0"/>
+              <a:t>ano e modifica </a:t>
+            </a:r>
+            <a:r>
+              <a:rPr lang="pt-BR" dirty="0"/>
+              <a:t>o comportamento dos agentes de acordo com </a:t>
+            </a:r>
+            <a:r>
+              <a:rPr lang="pt-BR" dirty="0" smtClean="0"/>
+              <a:t>elas</a:t>
+            </a:r>
+          </a:p>
+          <a:p>
+            <a:pPr lvl="1" algn="just"/>
+            <a:r>
+              <a:rPr lang="pt-BR" dirty="0" smtClean="0"/>
+              <a:t>No </a:t>
+            </a:r>
+            <a:r>
+              <a:rPr lang="pt-BR" dirty="0"/>
+              <a:t>outono e no inverno, </a:t>
+            </a:r>
+            <a:r>
+              <a:rPr lang="pt-BR" dirty="0" smtClean="0"/>
+              <a:t>como </a:t>
+            </a:r>
+            <a:r>
+              <a:rPr lang="pt-BR" dirty="0"/>
+              <a:t>são estações mais frias, os humanos necessitam da lã da ovelha para se manterem aquecidos, então nessas estações a probabilidade de matarem as ovelhas é </a:t>
+            </a:r>
+            <a:r>
+              <a:rPr lang="pt-BR" dirty="0" smtClean="0"/>
+              <a:t>duplicada</a:t>
+            </a:r>
+          </a:p>
+          <a:p>
+            <a:pPr lvl="1" algn="just"/>
+            <a:r>
+              <a:rPr lang="pt-BR" dirty="0" smtClean="0"/>
+              <a:t>A taxa de crescimento </a:t>
+            </a:r>
+            <a:r>
+              <a:rPr lang="pt-BR" dirty="0"/>
+              <a:t>da </a:t>
+            </a:r>
+            <a:r>
+              <a:rPr lang="pt-BR" dirty="0" smtClean="0"/>
+              <a:t>grama é duplicada na primavera e no verão</a:t>
+            </a:r>
+            <a:endParaRPr lang="en-US" dirty="0"/>
+          </a:p>
+        </p:txBody>
+      </p:sp>
+    </p:spTree>
+    <p:extLst>
+      <p:ext uri="{BB962C8B-B14F-4D97-AF65-F5344CB8AC3E}">
+        <p14:creationId xmlns:p14="http://schemas.microsoft.com/office/powerpoint/2010/main" val="575087011"/>
+      </p:ext>
+    </p:extLst>
+  </p:cSld>
+  <p:clrMapOvr>
+    <a:masterClrMapping/>
+  </p:clrMapOvr>
+</p:sld>
+</file>
+
+<file path=ppt/slides/slide11.xml><?xml version="1.0" encoding="utf-8"?>
+<p:sld xmlns:a="http://schemas.openxmlformats.org/drawingml/2006/main" xmlns:r="http://schemas.openxmlformats.org/officeDocument/2006/relationships" xmlns:p="http://schemas.openxmlformats.org/presentationml/2006/main">
+  <p:cSld>
+    <p:spTree>
+      <p:nvGrpSpPr>
+        <p:cNvPr id="1" name=""/>
+        <p:cNvGrpSpPr/>
+        <p:nvPr/>
+      </p:nvGrpSpPr>
+      <p:grpSpPr>
+        <a:xfrm>
+          <a:off x="0" y="0"/>
+          <a:ext cx="0" cy="0"/>
+          <a:chOff x="0" y="0"/>
+          <a:chExt cx="0" cy="0"/>
+        </a:xfrm>
+      </p:grpSpPr>
+      <p:sp>
+        <p:nvSpPr>
+          <p:cNvPr id="2" name="Título 1"/>
+          <p:cNvSpPr>
+            <a:spLocks noGrp="1"/>
+          </p:cNvSpPr>
+          <p:nvPr>
+            <p:ph type="title"/>
+          </p:nvPr>
+        </p:nvSpPr>
+        <p:spPr/>
+        <p:txBody>
+          <a:bodyPr/>
+          <a:lstStyle/>
+          <a:p>
+            <a:r>
+              <a:rPr lang="pt-BR" dirty="0" smtClean="0"/>
+              <a:t>Extensão do </a:t>
+            </a:r>
+            <a:r>
+              <a:rPr lang="pt-BR" i="1" dirty="0" smtClean="0"/>
+              <a:t>Wolf </a:t>
+            </a:r>
+            <a:r>
+              <a:rPr lang="pt-BR" i="1" dirty="0" err="1" smtClean="0"/>
+              <a:t>Sheep</a:t>
+            </a:r>
+            <a:r>
+              <a:rPr lang="pt-BR" i="1" dirty="0" smtClean="0"/>
+              <a:t> </a:t>
+            </a:r>
+            <a:r>
+              <a:rPr lang="pt-BR" i="1" dirty="0" err="1" smtClean="0"/>
+              <a:t>Predation</a:t>
+            </a:r>
+            <a:r>
+              <a:rPr lang="pt-BR" dirty="0" smtClean="0"/>
+              <a:t> (4)</a:t>
+            </a:r>
+            <a:endParaRPr lang="pt-BR" dirty="0"/>
+          </a:p>
+        </p:txBody>
+      </p:sp>
+      <p:sp>
+        <p:nvSpPr>
+          <p:cNvPr id="3" name="Espaço Reservado para Conteúdo 2"/>
+          <p:cNvSpPr>
+            <a:spLocks noGrp="1"/>
+          </p:cNvSpPr>
+          <p:nvPr>
+            <p:ph idx="1"/>
+          </p:nvPr>
+        </p:nvSpPr>
+        <p:spPr/>
+        <p:txBody>
+          <a:bodyPr/>
+          <a:lstStyle/>
+          <a:p>
+            <a:r>
+              <a:rPr lang="pt-BR" dirty="0" smtClean="0"/>
+              <a:t>Agentes</a:t>
+            </a:r>
+          </a:p>
+          <a:p>
+            <a:pPr lvl="1"/>
+            <a:r>
+              <a:rPr lang="pt-BR" dirty="0" smtClean="0"/>
+              <a:t>Ovelha</a:t>
+            </a:r>
+          </a:p>
+          <a:p>
+            <a:pPr lvl="1"/>
+            <a:r>
+              <a:rPr lang="pt-BR" dirty="0" smtClean="0"/>
+              <a:t>Lobo</a:t>
+            </a:r>
+          </a:p>
+          <a:p>
+            <a:pPr lvl="1"/>
+            <a:r>
+              <a:rPr lang="pt-BR" dirty="0" smtClean="0"/>
+              <a:t>Humano (novo)</a:t>
+            </a:r>
+          </a:p>
+          <a:p>
+            <a:pPr lvl="1"/>
+            <a:endParaRPr lang="pt-BR" dirty="0"/>
+          </a:p>
+        </p:txBody>
+      </p:sp>
+    </p:spTree>
+    <p:extLst>
+      <p:ext uri="{BB962C8B-B14F-4D97-AF65-F5344CB8AC3E}">
+        <p14:creationId xmlns:p14="http://schemas.microsoft.com/office/powerpoint/2010/main" val="1470915794"/>
+      </p:ext>
+    </p:extLst>
+  </p:cSld>
+  <p:clrMapOvr>
+    <a:masterClrMapping/>
+  </p:clrMapOvr>
+</p:sld>
+</file>
+
+<file path=ppt/slides/slide12.xml><?xml version="1.0" encoding="utf-8"?>
+<p:sld xmlns:a="http://schemas.openxmlformats.org/drawingml/2006/main" xmlns:r="http://schemas.openxmlformats.org/officeDocument/2006/relationships" xmlns:p="http://schemas.openxmlformats.org/presentationml/2006/main">
+  <p:cSld>
+    <p:spTree>
+      <p:nvGrpSpPr>
+        <p:cNvPr id="1" name=""/>
+        <p:cNvGrpSpPr/>
+        <p:nvPr/>
+      </p:nvGrpSpPr>
+      <p:grpSpPr>
+        <a:xfrm>
+          <a:off x="0" y="0"/>
+          <a:ext cx="0" cy="0"/>
+          <a:chOff x="0" y="0"/>
+          <a:chExt cx="0" cy="0"/>
+        </a:xfrm>
+      </p:grpSpPr>
+      <p:sp>
+        <p:nvSpPr>
+          <p:cNvPr id="2" name="Título 1"/>
+          <p:cNvSpPr>
+            <a:spLocks noGrp="1"/>
+          </p:cNvSpPr>
+          <p:nvPr>
+            <p:ph type="title"/>
+          </p:nvPr>
+        </p:nvSpPr>
+        <p:spPr/>
+        <p:txBody>
+          <a:bodyPr/>
+          <a:lstStyle/>
+          <a:p>
+            <a:r>
+              <a:rPr lang="pt-BR" dirty="0" smtClean="0"/>
+              <a:t>Extensão do </a:t>
+            </a:r>
+            <a:r>
+              <a:rPr lang="pt-BR" i="1" dirty="0" smtClean="0"/>
+              <a:t>Wolf </a:t>
+            </a:r>
+            <a:r>
+              <a:rPr lang="pt-BR" i="1" dirty="0" err="1" smtClean="0"/>
+              <a:t>Sheep</a:t>
+            </a:r>
+            <a:r>
+              <a:rPr lang="pt-BR" i="1" dirty="0" smtClean="0"/>
+              <a:t> </a:t>
+            </a:r>
+            <a:r>
+              <a:rPr lang="pt-BR" i="1" dirty="0" err="1" smtClean="0"/>
+              <a:t>Predation</a:t>
+            </a:r>
+            <a:r>
+              <a:rPr lang="pt-BR" dirty="0" smtClean="0"/>
+              <a:t> (5)</a:t>
+            </a:r>
+            <a:endParaRPr lang="pt-BR" dirty="0"/>
+          </a:p>
+        </p:txBody>
+      </p:sp>
+      <p:sp>
+        <p:nvSpPr>
+          <p:cNvPr id="3" name="Espaço Reservado para Conteúdo 2"/>
+          <p:cNvSpPr>
+            <a:spLocks noGrp="1"/>
+          </p:cNvSpPr>
+          <p:nvPr>
+            <p:ph idx="1"/>
+          </p:nvPr>
+        </p:nvSpPr>
+        <p:spPr/>
+        <p:txBody>
+          <a:bodyPr/>
+          <a:lstStyle/>
+          <a:p>
+            <a:r>
+              <a:rPr lang="pt-BR" dirty="0" smtClean="0"/>
+              <a:t>Parâmetros adicionados</a:t>
+            </a:r>
+          </a:p>
+          <a:p>
+            <a:pPr lvl="1"/>
+            <a:r>
+              <a:rPr lang="pt-BR" dirty="0" smtClean="0"/>
+              <a:t>Número de humanos</a:t>
+            </a:r>
+          </a:p>
+          <a:p>
+            <a:pPr lvl="1"/>
+            <a:r>
+              <a:rPr lang="pt-BR" dirty="0" smtClean="0"/>
+              <a:t>Ganho de energia dos humanos ao se alimentar </a:t>
+            </a:r>
+          </a:p>
+          <a:p>
+            <a:pPr lvl="1"/>
+            <a:r>
+              <a:rPr lang="pt-BR" dirty="0" smtClean="0"/>
+              <a:t>Taxa de reprodução  dos humanos</a:t>
+            </a:r>
+          </a:p>
+          <a:p>
+            <a:pPr lvl="1"/>
+            <a:r>
+              <a:rPr lang="pt-BR" dirty="0" smtClean="0"/>
+              <a:t>Taxa dos lobos comerem humanos</a:t>
+            </a:r>
+          </a:p>
+          <a:p>
+            <a:pPr lvl="1"/>
+            <a:r>
+              <a:rPr lang="pt-BR" dirty="0" smtClean="0"/>
+              <a:t>Taxa dos humanos caçarem/comerem lobos (depende da energia)</a:t>
+            </a:r>
+          </a:p>
+          <a:p>
+            <a:pPr lvl="1"/>
+            <a:r>
+              <a:rPr lang="pt-BR" dirty="0" smtClean="0"/>
+              <a:t>Taxa de humanos comerem ovelhas (depende da estação)</a:t>
+            </a:r>
+          </a:p>
+          <a:p>
+            <a:pPr lvl="1"/>
+            <a:r>
+              <a:rPr lang="pt-BR" dirty="0" smtClean="0"/>
+              <a:t>Total de </a:t>
+            </a:r>
+            <a:r>
+              <a:rPr lang="pt-BR" i="1" dirty="0" err="1" smtClean="0"/>
+              <a:t>ticks</a:t>
+            </a:r>
+            <a:r>
+              <a:rPr lang="pt-BR" dirty="0" smtClean="0"/>
+              <a:t> por estação do ano</a:t>
+            </a:r>
+          </a:p>
+          <a:p>
+            <a:pPr lvl="1"/>
+            <a:endParaRPr lang="pt-BR" dirty="0"/>
+          </a:p>
+        </p:txBody>
+      </p:sp>
+    </p:spTree>
+    <p:extLst>
+      <p:ext uri="{BB962C8B-B14F-4D97-AF65-F5344CB8AC3E}">
+        <p14:creationId xmlns:p14="http://schemas.microsoft.com/office/powerpoint/2010/main" val="3478064644"/>
+      </p:ext>
+    </p:extLst>
+  </p:cSld>
+  <p:clrMapOvr>
+    <a:masterClrMapping/>
+  </p:clrMapOvr>
+</p:sld>
+</file>
+
+<file path=ppt/slides/slide13.xml><?xml version="1.0" encoding="utf-8"?>
+<p:sld xmlns:a="http://schemas.openxmlformats.org/drawingml/2006/main" xmlns:r="http://schemas.openxmlformats.org/officeDocument/2006/relationships" xmlns:p="http://schemas.openxmlformats.org/presentationml/2006/main">
+  <p:cSld>
+    <p:spTree>
+      <p:nvGrpSpPr>
+        <p:cNvPr id="1" name=""/>
+        <p:cNvGrpSpPr/>
+        <p:nvPr/>
+      </p:nvGrpSpPr>
+      <p:grpSpPr>
+        <a:xfrm>
+          <a:off x="0" y="0"/>
+          <a:ext cx="0" cy="0"/>
+          <a:chOff x="0" y="0"/>
+          <a:chExt cx="0" cy="0"/>
+        </a:xfrm>
+      </p:grpSpPr>
+      <p:sp>
+        <p:nvSpPr>
+          <p:cNvPr id="2" name="Título 1"/>
+          <p:cNvSpPr>
+            <a:spLocks noGrp="1"/>
+          </p:cNvSpPr>
+          <p:nvPr>
+            <p:ph type="title"/>
+          </p:nvPr>
+        </p:nvSpPr>
+        <p:spPr/>
+        <p:txBody>
+          <a:bodyPr/>
+          <a:lstStyle/>
+          <a:p>
+            <a:r>
+              <a:rPr lang="pt-BR" dirty="0" smtClean="0"/>
+              <a:t>Extensão do </a:t>
+            </a:r>
+            <a:r>
+              <a:rPr lang="pt-BR" i="1" dirty="0" smtClean="0"/>
+              <a:t>Wolf </a:t>
+            </a:r>
+            <a:r>
+              <a:rPr lang="pt-BR" i="1" dirty="0" err="1" smtClean="0"/>
+              <a:t>Sheep</a:t>
+            </a:r>
+            <a:r>
+              <a:rPr lang="pt-BR" i="1" dirty="0" smtClean="0"/>
+              <a:t> </a:t>
+            </a:r>
+            <a:r>
+              <a:rPr lang="pt-BR" i="1" dirty="0" err="1" smtClean="0"/>
+              <a:t>Predation</a:t>
+            </a:r>
+            <a:r>
+              <a:rPr lang="pt-BR" dirty="0" smtClean="0"/>
+              <a:t> (6)</a:t>
+            </a:r>
+            <a:endParaRPr lang="pt-BR" dirty="0"/>
+          </a:p>
+        </p:txBody>
+      </p:sp>
+      <p:sp>
+        <p:nvSpPr>
+          <p:cNvPr id="3" name="Espaço Reservado para Conteúdo 2"/>
+          <p:cNvSpPr>
+            <a:spLocks noGrp="1"/>
+          </p:cNvSpPr>
+          <p:nvPr>
+            <p:ph idx="1"/>
+          </p:nvPr>
+        </p:nvSpPr>
+        <p:spPr/>
+        <p:txBody>
+          <a:bodyPr/>
+          <a:lstStyle/>
+          <a:p>
+            <a:r>
+              <a:rPr lang="pt-BR" dirty="0" smtClean="0"/>
+              <a:t>Monitoramento</a:t>
+            </a:r>
+          </a:p>
+          <a:p>
+            <a:pPr lvl="1"/>
+            <a:r>
+              <a:rPr lang="pt-BR" dirty="0" smtClean="0"/>
+              <a:t>Para cada estação do ano, gráfico </a:t>
+            </a:r>
+            <a:r>
+              <a:rPr lang="pt-BR" dirty="0"/>
+              <a:t>de quantidade </a:t>
+            </a:r>
+            <a:r>
+              <a:rPr lang="pt-BR" dirty="0" smtClean="0"/>
+              <a:t>de agentes (humanos, ovelha e lobos) por </a:t>
+            </a:r>
+            <a:r>
+              <a:rPr lang="pt-BR" i="1" dirty="0" err="1" smtClean="0"/>
+              <a:t>tick</a:t>
+            </a:r>
+            <a:r>
+              <a:rPr lang="pt-BR" dirty="0" smtClean="0"/>
+              <a:t> de simulação</a:t>
+            </a:r>
+          </a:p>
+          <a:p>
+            <a:pPr lvl="1"/>
+            <a:r>
+              <a:rPr lang="pt-BR" dirty="0" smtClean="0"/>
+              <a:t>Monitor de quantidade de agentes </a:t>
+            </a:r>
+          </a:p>
+          <a:p>
+            <a:pPr lvl="1"/>
+            <a:r>
+              <a:rPr lang="pt-BR" dirty="0" smtClean="0"/>
+              <a:t>Monitor da estação do ano</a:t>
+            </a:r>
+            <a:endParaRPr lang="pt-BR" dirty="0"/>
+          </a:p>
+        </p:txBody>
+      </p:sp>
+    </p:spTree>
+    <p:extLst>
+      <p:ext uri="{BB962C8B-B14F-4D97-AF65-F5344CB8AC3E}">
+        <p14:creationId xmlns:p14="http://schemas.microsoft.com/office/powerpoint/2010/main" val="3034317986"/>
+      </p:ext>
+    </p:extLst>
+  </p:cSld>
+  <p:clrMapOvr>
+    <a:masterClrMapping/>
+  </p:clrMapOvr>
+</p:sld>
+</file>
+
+<file path=ppt/slides/slide14.xml><?xml version="1.0" encoding="utf-8"?>
+<p:sld xmlns:a="http://schemas.openxmlformats.org/drawingml/2006/main" xmlns:r="http://schemas.openxmlformats.org/officeDocument/2006/relationships" xmlns:p="http://schemas.openxmlformats.org/presentationml/2006/main">
+  <p:cSld>
+    <p:spTree>
+      <p:nvGrpSpPr>
+        <p:cNvPr id="1" name=""/>
+        <p:cNvGrpSpPr/>
+        <p:nvPr/>
+      </p:nvGrpSpPr>
+      <p:grpSpPr>
+        <a:xfrm>
+          <a:off x="0" y="0"/>
+          <a:ext cx="0" cy="0"/>
+          <a:chOff x="0" y="0"/>
+          <a:chExt cx="0" cy="0"/>
+        </a:xfrm>
+      </p:grpSpPr>
+      <p:sp>
+        <p:nvSpPr>
+          <p:cNvPr id="2" name="Título 1"/>
+          <p:cNvSpPr>
+            <a:spLocks noGrp="1"/>
+          </p:cNvSpPr>
+          <p:nvPr>
+            <p:ph type="title"/>
+          </p:nvPr>
+        </p:nvSpPr>
+        <p:spPr/>
+        <p:txBody>
+          <a:bodyPr/>
+          <a:lstStyle/>
+          <a:p>
+            <a:r>
+              <a:rPr lang="pt-BR" dirty="0" smtClean="0"/>
+              <a:t>Extensão do </a:t>
+            </a:r>
+            <a:r>
+              <a:rPr lang="pt-BR" i="1" dirty="0" smtClean="0"/>
+              <a:t>Wolf </a:t>
+            </a:r>
+            <a:r>
+              <a:rPr lang="pt-BR" i="1" dirty="0" err="1" smtClean="0"/>
+              <a:t>Sheep</a:t>
+            </a:r>
+            <a:r>
+              <a:rPr lang="pt-BR" i="1" dirty="0" smtClean="0"/>
+              <a:t> </a:t>
+            </a:r>
+            <a:r>
+              <a:rPr lang="pt-BR" i="1" dirty="0" err="1" smtClean="0"/>
+              <a:t>Predation</a:t>
+            </a:r>
+            <a:r>
+              <a:rPr lang="pt-BR" dirty="0" smtClean="0"/>
+              <a:t> (7)</a:t>
+            </a:r>
+            <a:endParaRPr lang="pt-BR" dirty="0"/>
+          </a:p>
+        </p:txBody>
+      </p:sp>
+      <p:sp>
+        <p:nvSpPr>
+          <p:cNvPr id="3" name="Espaço Reservado para Conteúdo 2"/>
+          <p:cNvSpPr>
+            <a:spLocks noGrp="1"/>
+          </p:cNvSpPr>
+          <p:nvPr>
+            <p:ph idx="1"/>
+          </p:nvPr>
+        </p:nvSpPr>
+        <p:spPr>
+          <a:xfrm>
+            <a:off x="838200" y="1617395"/>
+            <a:ext cx="10515600" cy="4351338"/>
+          </a:xfrm>
+        </p:spPr>
+        <p:txBody>
+          <a:bodyPr/>
+          <a:lstStyle/>
+          <a:p>
+            <a:endParaRPr lang="pt-BR" dirty="0"/>
+          </a:p>
+        </p:txBody>
+      </p:sp>
+      <p:pic>
+        <p:nvPicPr>
+          <p:cNvPr id="5" name="Imagem 4"/>
+          <p:cNvPicPr>
+            <a:picLocks noChangeAspect="1"/>
+          </p:cNvPicPr>
+          <p:nvPr/>
+        </p:nvPicPr>
+        <p:blipFill>
+          <a:blip r:embed="rId2"/>
+          <a:stretch>
+            <a:fillRect/>
+          </a:stretch>
+        </p:blipFill>
+        <p:spPr>
+          <a:xfrm>
+            <a:off x="1414952" y="1617395"/>
+            <a:ext cx="9362095" cy="5032126"/>
+          </a:xfrm>
+          <a:prstGeom prst="rect">
+            <a:avLst/>
+          </a:prstGeom>
+        </p:spPr>
+      </p:pic>
+    </p:spTree>
+    <p:extLst>
+      <p:ext uri="{BB962C8B-B14F-4D97-AF65-F5344CB8AC3E}">
+        <p14:creationId xmlns:p14="http://schemas.microsoft.com/office/powerpoint/2010/main" val="436781355"/>
+      </p:ext>
+    </p:extLst>
+  </p:cSld>
+  <p:clrMapOvr>
+    <a:masterClrMapping/>
+  </p:clrMapOvr>
+</p:sld>
+</file>
+
+<file path=ppt/slides/slide15.xml><?xml version="1.0" encoding="utf-8"?>
+<p:sld xmlns:a="http://schemas.openxmlformats.org/drawingml/2006/main" xmlns:r="http://schemas.openxmlformats.org/officeDocument/2006/relationships" xmlns:p="http://schemas.openxmlformats.org/presentationml/2006/main">
+  <p:cSld>
+    <p:spTree>
+      <p:nvGrpSpPr>
+        <p:cNvPr id="1" name=""/>
+        <p:cNvGrpSpPr/>
+        <p:nvPr/>
+      </p:nvGrpSpPr>
+      <p:grpSpPr>
+        <a:xfrm>
+          <a:off x="0" y="0"/>
+          <a:ext cx="0" cy="0"/>
+          <a:chOff x="0" y="0"/>
+          <a:chExt cx="0" cy="0"/>
+        </a:xfrm>
+      </p:grpSpPr>
+      <p:sp>
+        <p:nvSpPr>
+          <p:cNvPr id="2" name="Título 1"/>
+          <p:cNvSpPr>
+            <a:spLocks noGrp="1"/>
+          </p:cNvSpPr>
+          <p:nvPr>
+            <p:ph type="ctrTitle"/>
+          </p:nvPr>
+        </p:nvSpPr>
+        <p:spPr/>
+        <p:txBody>
+          <a:bodyPr/>
+          <a:lstStyle/>
+          <a:p>
+            <a:r>
+              <a:rPr lang="pt-BR" dirty="0" smtClean="0"/>
+              <a:t>Trabalho </a:t>
+            </a:r>
+            <a:r>
+              <a:rPr lang="pt-BR" dirty="0" err="1" smtClean="0"/>
+              <a:t>Netlogo</a:t>
+            </a:r>
+            <a:endParaRPr lang="pt-BR" dirty="0"/>
+          </a:p>
+        </p:txBody>
+      </p:sp>
+      <p:sp>
+        <p:nvSpPr>
+          <p:cNvPr id="3" name="Subtítulo 2"/>
+          <p:cNvSpPr>
+            <a:spLocks noGrp="1"/>
+          </p:cNvSpPr>
+          <p:nvPr>
+            <p:ph type="subTitle" idx="1"/>
+          </p:nvPr>
+        </p:nvSpPr>
+        <p:spPr/>
+        <p:txBody>
+          <a:bodyPr>
+            <a:normAutofit lnSpcReduction="10000"/>
+          </a:bodyPr>
+          <a:lstStyle/>
+          <a:p>
+            <a:r>
+              <a:rPr lang="pt-BR" dirty="0" smtClean="0"/>
+              <a:t>Karine P. Ramos, Mairon A. Belchior e Renata Z. Junges</a:t>
+            </a:r>
+          </a:p>
+          <a:p>
+            <a:endParaRPr lang="pt-BR" dirty="0"/>
+          </a:p>
+          <a:p>
+            <a:r>
+              <a:rPr lang="pt-BR" dirty="0" smtClean="0"/>
+              <a:t>Simulação Social: Teorias e Aplicações - 2019/1</a:t>
+            </a:r>
+          </a:p>
+          <a:p>
+            <a:r>
+              <a:rPr lang="pt-BR" dirty="0" smtClean="0"/>
+              <a:t>Profa. Diana F. </a:t>
+            </a:r>
+            <a:r>
+              <a:rPr lang="pt-BR" dirty="0" err="1" smtClean="0"/>
+              <a:t>Adamatti</a:t>
+            </a:r>
+            <a:endParaRPr lang="pt-BR" dirty="0" smtClean="0"/>
+          </a:p>
+          <a:p>
+            <a:endParaRPr lang="pt-BR" dirty="0" smtClean="0"/>
+          </a:p>
+          <a:p>
+            <a:endParaRPr lang="pt-BR" dirty="0"/>
+          </a:p>
+        </p:txBody>
+      </p:sp>
+    </p:spTree>
+    <p:extLst>
+      <p:ext uri="{BB962C8B-B14F-4D97-AF65-F5344CB8AC3E}">
+        <p14:creationId xmlns:p14="http://schemas.microsoft.com/office/powerpoint/2010/main" val="2842025611"/>
+      </p:ext>
+    </p:extLst>
+  </p:cSld>
+  <p:clrMapOvr>
+    <a:masterClrMapping/>
+  </p:clrMapOvr>
+</p:sld>
+</file>
+
 <file path=ppt/slides/slide2.xml><?xml version="1.0" encoding="utf-8"?>
 <p:sld xmlns:a="http://schemas.openxmlformats.org/drawingml/2006/main" xmlns:r="http://schemas.openxmlformats.org/officeDocument/2006/relationships" xmlns:p="http://schemas.openxmlformats.org/presentationml/2006/main">
   <p:cSld>
@@ -3247,79 +4067,113 @@
         </p:nvSpPr>
         <p:spPr/>
         <p:txBody>
-          <a:bodyPr/>
-          <a:lstStyle/>
-          <a:p>
+          <a:bodyPr>
+            <a:normAutofit lnSpcReduction="10000"/>
+          </a:bodyPr>
+          <a:lstStyle/>
+          <a:p>
+            <a:pPr algn="just"/>
             <a:r>
               <a:rPr lang="pt-BR" dirty="0" smtClean="0"/>
               <a:t>Objetivo</a:t>
             </a:r>
           </a:p>
           <a:p>
-            <a:pPr lvl="1"/>
+            <a:pPr lvl="1" algn="just"/>
             <a:r>
               <a:rPr lang="pt-BR" dirty="0" smtClean="0"/>
               <a:t>Verificar como a quantidade de cada grupo de veículo influencia na poluição do ambiente</a:t>
             </a:r>
           </a:p>
           <a:p>
+            <a:pPr algn="just"/>
             <a:r>
               <a:rPr lang="pt-BR" dirty="0" smtClean="0"/>
               <a:t>Simulação</a:t>
             </a:r>
           </a:p>
           <a:p>
-            <a:pPr lvl="1"/>
+            <a:pPr lvl="1" algn="just"/>
             <a:r>
               <a:rPr lang="pt-BR" dirty="0" smtClean="0"/>
               <a:t>Cada veículo é um agente e polui um valor X a cada </a:t>
             </a:r>
             <a:r>
-              <a:rPr lang="pt-BR" dirty="0" err="1" smtClean="0"/>
+              <a:rPr lang="pt-BR" i="1" dirty="0" err="1" smtClean="0"/>
               <a:t>tick</a:t>
             </a:r>
             <a:r>
               <a:rPr lang="pt-BR" dirty="0" smtClean="0"/>
-              <a:t> da </a:t>
-            </a:r>
-            <a:r>
-              <a:rPr lang="pt-BR" dirty="0" smtClean="0"/>
-              <a:t>simula</a:t>
-            </a:r>
-            <a:r>
-              <a:rPr lang="en-US" dirty="0" err="1" smtClean="0"/>
+              <a:t> da simula</a:t>
+            </a:r>
+            <a:r>
+              <a:rPr lang="pt-BR" dirty="0" smtClean="0"/>
               <a:t>ção</a:t>
             </a:r>
+          </a:p>
+          <a:p>
+            <a:pPr lvl="1" algn="just"/>
+            <a:r>
+              <a:rPr lang="pt-BR" dirty="0" smtClean="0"/>
+              <a:t>A cada </a:t>
+            </a:r>
+            <a:r>
+              <a:rPr lang="pt-BR" i="1" dirty="0" err="1" smtClean="0"/>
+              <a:t>tick</a:t>
+            </a:r>
+            <a:r>
+              <a:rPr lang="pt-BR" dirty="0" smtClean="0"/>
+              <a:t> é dissipada parte da poluição total do ambiente </a:t>
+            </a:r>
+          </a:p>
+          <a:p>
+            <a:pPr lvl="1" algn="just"/>
+            <a:r>
+              <a:rPr lang="pt-BR" dirty="0" smtClean="0"/>
+              <a:t>Cada agente percorre uma quantidade predefinida de quilômetros</a:t>
+            </a:r>
+          </a:p>
+          <a:p>
+            <a:pPr lvl="1" algn="just"/>
+            <a:r>
+              <a:rPr lang="pt-BR" dirty="0" smtClean="0"/>
+              <a:t>Quando o agente atinge a quilometragem definida, ele para de poluir, e tem sua co</a:t>
+            </a:r>
+            <a:r>
+              <a:rPr lang="pt-BR" dirty="0" smtClean="0"/>
+              <a:t>r alterada para azul</a:t>
+            </a:r>
+          </a:p>
+          <a:p>
+            <a:pPr lvl="1" algn="just"/>
+            <a:r>
+              <a:rPr lang="pt-BR" dirty="0" smtClean="0"/>
+              <a:t>Ultrapassagem </a:t>
+            </a:r>
+            <a:r>
+              <a:rPr lang="pt-BR" dirty="0"/>
+              <a:t>de carros inativos</a:t>
+            </a:r>
             <a:endParaRPr lang="pt-BR" dirty="0" smtClean="0"/>
           </a:p>
           <a:p>
-            <a:pPr lvl="1"/>
-            <a:r>
-              <a:rPr lang="pt-BR" dirty="0" smtClean="0"/>
-              <a:t>Cara agente </a:t>
-            </a:r>
-            <a:r>
-              <a:rPr lang="pt-BR" dirty="0" smtClean="0"/>
-              <a:t>percorre uma </a:t>
-            </a:r>
-            <a:r>
-              <a:rPr lang="pt-BR" dirty="0" smtClean="0"/>
-              <a:t>quantidade predefinida de quilômetros</a:t>
-            </a:r>
-          </a:p>
-          <a:p>
-            <a:pPr lvl="1"/>
-            <a:r>
-              <a:rPr lang="pt-BR" dirty="0" smtClean="0"/>
-              <a:t>Quando o agente atinge a quilometragem definida, ele para de poluir</a:t>
-            </a:r>
-          </a:p>
-          <a:p>
-            <a:pPr lvl="1"/>
+            <a:pPr lvl="1" algn="just"/>
+            <a:r>
+              <a:rPr lang="pt-BR" dirty="0" smtClean="0"/>
+              <a:t>Simulação termina quando todos os agentes percorrem a dis</a:t>
+            </a:r>
+            <a:r>
+              <a:rPr lang="pt-BR" dirty="0" smtClean="0"/>
+              <a:t>tância predefinida</a:t>
+            </a:r>
             <a:endParaRPr lang="pt-BR" dirty="0" smtClean="0"/>
           </a:p>
           <a:p>
-            <a:pPr lvl="1"/>
+            <a:pPr lvl="1" algn="just"/>
+            <a:endParaRPr lang="pt-BR" dirty="0" smtClean="0"/>
+          </a:p>
+          <a:p>
+            <a:pPr lvl="1" algn="just"/>
             <a:endParaRPr lang="pt-BR" dirty="0"/>
           </a:p>
         </p:txBody>
@@ -3634,8 +4488,13 @@
           <a:p>
             <a:r>
               <a:rPr lang="pt-BR" dirty="0" smtClean="0"/>
-              <a:t>Parâmetros novos</a:t>
-            </a:r>
+              <a:t>Parâmetros </a:t>
+            </a:r>
+            <a:r>
+              <a:rPr lang="pt-BR" dirty="0" smtClean="0"/>
+              <a:t>adicionados</a:t>
+            </a:r>
+            <a:endParaRPr lang="pt-BR" dirty="0" smtClean="0"/>
           </a:p>
           <a:p>
             <a:pPr lvl="1"/>
@@ -3720,6 +4579,13 @@
   <p:clrMapOvr>
     <a:masterClrMapping/>
   </p:clrMapOvr>
+  <p:timing>
+    <p:tnLst>
+      <p:par>
+        <p:cTn id="1" dur="indefinite" restart="never" nodeType="tmRoot"/>
+      </p:par>
+    </p:tnLst>
+  </p:timing>
 </p:sld>
 </file>
 
@@ -3806,7 +4672,7 @@
               <a:t>Gráfico de poluição total do ambiente por </a:t>
             </a:r>
             <a:r>
-              <a:rPr lang="pt-BR" dirty="0" err="1" smtClean="0"/>
+              <a:rPr lang="pt-BR" i="1" dirty="0" err="1" smtClean="0"/>
               <a:t>tick</a:t>
             </a:r>
             <a:r>
@@ -3821,7 +4687,7 @@
               <a:t>Gráfico de poluição de cada tipo de veículo por </a:t>
             </a:r>
             <a:r>
-              <a:rPr lang="pt-BR" dirty="0" err="1" smtClean="0"/>
+              <a:rPr lang="pt-BR" i="1" dirty="0" err="1" smtClean="0"/>
               <a:t>tick</a:t>
             </a:r>
             <a:r>
@@ -3836,7 +4702,7 @@
               <a:t>Gráfico de quantidade de veículos ativos por </a:t>
             </a:r>
             <a:r>
-              <a:rPr lang="pt-BR" dirty="0" err="1" smtClean="0"/>
+              <a:rPr lang="pt-BR" i="1" dirty="0" err="1" smtClean="0"/>
               <a:t>tick</a:t>
             </a:r>
             <a:r>
@@ -3863,6 +4729,13 @@
   <p:clrMapOvr>
     <a:masterClrMapping/>
   </p:clrMapOvr>
+  <p:timing>
+    <p:tnLst>
+      <p:par>
+        <p:cTn id="1" dur="indefinite" restart="never" nodeType="tmRoot"/>
+      </p:par>
+    </p:tnLst>
+  </p:timing>
 </p:sld>
 </file>
 
@@ -3899,6 +4772,129 @@
           <a:lstStyle/>
           <a:p>
             <a:r>
+              <a:rPr lang="pt-BR" dirty="0"/>
+              <a:t>Extensão do </a:t>
+            </a:r>
+            <a:r>
+              <a:rPr lang="pt-BR" i="1" dirty="0" err="1"/>
+              <a:t>Traffic</a:t>
+            </a:r>
+            <a:r>
+              <a:rPr lang="pt-BR" i="1" dirty="0"/>
+              <a:t> Grid </a:t>
+            </a:r>
+            <a:r>
+              <a:rPr lang="pt-BR" i="1" dirty="0" err="1"/>
+              <a:t>Goal</a:t>
+            </a:r>
+            <a:r>
+              <a:rPr lang="pt-BR" dirty="0"/>
+              <a:t> </a:t>
+            </a:r>
+            <a:r>
+              <a:rPr lang="pt-BR" dirty="0" smtClean="0"/>
+              <a:t>(5)</a:t>
+            </a:r>
+            <a:endParaRPr lang="en-US" dirty="0"/>
+          </a:p>
+        </p:txBody>
+      </p:sp>
+      <p:sp>
+        <p:nvSpPr>
+          <p:cNvPr id="3" name="Espaço Reservado para Conteúdo 2"/>
+          <p:cNvSpPr>
+            <a:spLocks noGrp="1"/>
+          </p:cNvSpPr>
+          <p:nvPr>
+            <p:ph idx="1"/>
+          </p:nvPr>
+        </p:nvSpPr>
+        <p:spPr/>
+        <p:txBody>
+          <a:bodyPr/>
+          <a:lstStyle/>
+          <a:p>
+            <a:endParaRPr lang="en-US" dirty="0"/>
+          </a:p>
+        </p:txBody>
+      </p:sp>
+      <p:pic>
+        <p:nvPicPr>
+          <p:cNvPr id="5" name="Imagem 4"/>
+          <p:cNvPicPr>
+            <a:picLocks noChangeAspect="1"/>
+          </p:cNvPicPr>
+          <p:nvPr/>
+        </p:nvPicPr>
+        <p:blipFill>
+          <a:blip r:embed="rId2"/>
+          <a:stretch>
+            <a:fillRect/>
+          </a:stretch>
+        </p:blipFill>
+        <p:spPr>
+          <a:xfrm>
+            <a:off x="1195765" y="1690688"/>
+            <a:ext cx="9586912" cy="5142979"/>
+          </a:xfrm>
+          <a:prstGeom prst="rect">
+            <a:avLst/>
+          </a:prstGeom>
+        </p:spPr>
+      </p:pic>
+    </p:spTree>
+    <p:extLst>
+      <p:ext uri="{BB962C8B-B14F-4D97-AF65-F5344CB8AC3E}">
+        <p14:creationId xmlns:p14="http://schemas.microsoft.com/office/powerpoint/2010/main" val="2993257296"/>
+      </p:ext>
+    </p:extLst>
+  </p:cSld>
+  <p:clrMapOvr>
+    <a:masterClrMapping/>
+  </p:clrMapOvr>
+  <p:timing>
+    <p:tnLst>
+      <p:par>
+        <p:cTn id="1" dur="indefinite" restart="never" nodeType="tmRoot"/>
+      </p:par>
+    </p:tnLst>
+  </p:timing>
+</p:sld>
+</file>
+
+<file path=ppt/slides/slide8.xml><?xml version="1.0" encoding="utf-8"?>
+<p:sld xmlns:a="http://schemas.openxmlformats.org/drawingml/2006/main" xmlns:r="http://schemas.openxmlformats.org/officeDocument/2006/relationships" xmlns:p="http://schemas.openxmlformats.org/presentationml/2006/main">
+  <p:cSld>
+    <p:spTree>
+      <p:nvGrpSpPr>
+        <p:cNvPr id="1" name=""/>
+        <p:cNvGrpSpPr/>
+        <p:nvPr/>
+      </p:nvGrpSpPr>
+      <p:grpSpPr>
+        <a:xfrm>
+          <a:off x="0" y="0"/>
+          <a:ext cx="0" cy="0"/>
+          <a:chOff x="0" y="0"/>
+          <a:chExt cx="0" cy="0"/>
+        </a:xfrm>
+      </p:grpSpPr>
+      <p:sp>
+        <p:nvSpPr>
+          <p:cNvPr id="2" name="Título 1"/>
+          <p:cNvSpPr>
+            <a:spLocks noGrp="1"/>
+          </p:cNvSpPr>
+          <p:nvPr>
+            <p:ph type="title"/>
+          </p:nvPr>
+        </p:nvSpPr>
+        <p:spPr/>
+        <p:txBody>
+          <a:bodyPr/>
+          <a:lstStyle/>
+          <a:p>
+            <a:r>
               <a:rPr lang="pt-BR" dirty="0" smtClean="0"/>
               <a:t>Extensão do </a:t>
             </a:r>
@@ -3937,21 +4933,53 @@
           <a:bodyPr/>
           <a:lstStyle/>
           <a:p>
+            <a:pPr algn="just"/>
             <a:r>
               <a:rPr lang="pt-BR" dirty="0" smtClean="0"/>
               <a:t>Objetivo</a:t>
             </a:r>
           </a:p>
           <a:p>
+            <a:pPr lvl="1" algn="just"/>
+            <a:r>
+              <a:rPr lang="pt-BR" dirty="0" smtClean="0"/>
+              <a:t>Analisar </a:t>
+            </a:r>
+            <a:r>
+              <a:rPr lang="pt-BR" dirty="0"/>
+              <a:t>a população de cada tipo de agente de acordo com a estação do </a:t>
+            </a:r>
+            <a:r>
+              <a:rPr lang="pt-BR" dirty="0" smtClean="0"/>
+              <a:t>ano</a:t>
+            </a:r>
+          </a:p>
+          <a:p>
+            <a:pPr lvl="1" algn="just"/>
+            <a:r>
+              <a:rPr lang="pt-BR" dirty="0" smtClean="0"/>
+              <a:t>Analisar como </a:t>
+            </a:r>
+            <a:r>
+              <a:rPr lang="pt-BR" dirty="0"/>
+              <a:t>a quantidade inicial de cada grupo de agente e suas probabilidades de caçar suas presas e taxas de reprodução influenciam no ambiente após alguns </a:t>
+            </a:r>
+            <a:r>
+              <a:rPr lang="pt-BR" i="1" dirty="0" err="1"/>
+              <a:t>ticks</a:t>
+            </a:r>
+            <a:r>
+              <a:rPr lang="pt-BR" dirty="0"/>
+              <a:t>.</a:t>
+            </a:r>
             <a:endParaRPr lang="pt-BR" dirty="0"/>
           </a:p>
           <a:p>
-            <a:r>
-              <a:rPr lang="pt-BR" dirty="0" smtClean="0"/>
-              <a:t>Simulação</a:t>
-            </a:r>
-          </a:p>
-          <a:p>
+            <a:pPr algn="just"/>
+            <a:endParaRPr lang="pt-BR" dirty="0" smtClean="0"/>
+          </a:p>
+          <a:p>
+            <a:pPr lvl="1"/>
             <a:endParaRPr lang="pt-BR" dirty="0"/>
           </a:p>
         </p:txBody>
@@ -3966,6 +4994,222 @@
   <p:clrMapOvr>
     <a:masterClrMapping/>
   </p:clrMapOvr>
+  <p:timing>
+    <p:tnLst>
+      <p:par>
+        <p:cTn id="1" dur="indefinite" restart="never" nodeType="tmRoot"/>
+      </p:par>
+    </p:tnLst>
+  </p:timing>
+</p:sld>
+</file>
+
+<file path=ppt/slides/slide9.xml><?xml version="1.0" encoding="utf-8"?>
+<p:sld xmlns:a="http://schemas.openxmlformats.org/drawingml/2006/main" xmlns:r="http://schemas.openxmlformats.org/officeDocument/2006/relationships" xmlns:p="http://schemas.openxmlformats.org/presentationml/2006/main">
+  <p:cSld>
+    <p:spTree>
+      <p:nvGrpSpPr>
+        <p:cNvPr id="1" name=""/>
+        <p:cNvGrpSpPr/>
+        <p:nvPr/>
+      </p:nvGrpSpPr>
+      <p:grpSpPr>
+        <a:xfrm>
+          <a:off x="0" y="0"/>
+          <a:ext cx="0" cy="0"/>
+          <a:chOff x="0" y="0"/>
+          <a:chExt cx="0" cy="0"/>
+        </a:xfrm>
+      </p:grpSpPr>
+      <p:sp>
+        <p:nvSpPr>
+          <p:cNvPr id="2" name="Título 1"/>
+          <p:cNvSpPr>
+            <a:spLocks noGrp="1"/>
+          </p:cNvSpPr>
+          <p:nvPr>
+            <p:ph type="title"/>
+          </p:nvPr>
+        </p:nvSpPr>
+        <p:spPr/>
+        <p:txBody>
+          <a:bodyPr/>
+          <a:lstStyle/>
+          <a:p>
+            <a:r>
+              <a:rPr lang="pt-BR" dirty="0" smtClean="0"/>
+              <a:t>Extensão do </a:t>
+            </a:r>
+            <a:r>
+              <a:rPr lang="pt-BR" i="1" dirty="0" smtClean="0"/>
+              <a:t>Wolf </a:t>
+            </a:r>
+            <a:r>
+              <a:rPr lang="pt-BR" i="1" dirty="0" err="1" smtClean="0"/>
+              <a:t>Sheep</a:t>
+            </a:r>
+            <a:r>
+              <a:rPr lang="pt-BR" i="1" dirty="0" smtClean="0"/>
+              <a:t> </a:t>
+            </a:r>
+            <a:r>
+              <a:rPr lang="pt-BR" i="1" dirty="0" err="1" smtClean="0"/>
+              <a:t>Predation</a:t>
+            </a:r>
+            <a:r>
+              <a:rPr lang="pt-BR" dirty="0"/>
+              <a:t> </a:t>
+            </a:r>
+            <a:r>
+              <a:rPr lang="pt-BR" dirty="0" smtClean="0"/>
+              <a:t>(2)</a:t>
+            </a:r>
+            <a:endParaRPr lang="pt-BR" dirty="0"/>
+          </a:p>
+        </p:txBody>
+      </p:sp>
+      <p:sp>
+        <p:nvSpPr>
+          <p:cNvPr id="3" name="Espaço Reservado para Conteúdo 2"/>
+          <p:cNvSpPr>
+            <a:spLocks noGrp="1"/>
+          </p:cNvSpPr>
+          <p:nvPr>
+            <p:ph idx="1"/>
+          </p:nvPr>
+        </p:nvSpPr>
+        <p:spPr/>
+        <p:txBody>
+          <a:bodyPr>
+            <a:normAutofit/>
+          </a:bodyPr>
+          <a:lstStyle/>
+          <a:p>
+            <a:pPr algn="just"/>
+            <a:r>
+              <a:rPr lang="pt-BR" dirty="0" smtClean="0"/>
+              <a:t>Simulação</a:t>
+            </a:r>
+            <a:endParaRPr lang="pt-BR" dirty="0" smtClean="0"/>
+          </a:p>
+          <a:p>
+            <a:pPr lvl="1" algn="just"/>
+            <a:r>
+              <a:rPr lang="pt-BR" dirty="0" smtClean="0"/>
+              <a:t>Os </a:t>
+            </a:r>
+            <a:r>
+              <a:rPr lang="pt-BR" dirty="0"/>
+              <a:t>lobos matam os humanos de acordo com uma certa </a:t>
+            </a:r>
+            <a:r>
+              <a:rPr lang="pt-BR" dirty="0" smtClean="0"/>
+              <a:t>probabilidade</a:t>
+            </a:r>
+          </a:p>
+          <a:p>
+            <a:pPr lvl="1" algn="just"/>
+            <a:r>
+              <a:rPr lang="pt-BR" dirty="0" smtClean="0"/>
+              <a:t>Os </a:t>
+            </a:r>
+            <a:r>
+              <a:rPr lang="pt-BR" dirty="0"/>
+              <a:t>humanos matam e comem as ovelhas para obter </a:t>
+            </a:r>
+            <a:r>
+              <a:rPr lang="pt-BR" dirty="0" smtClean="0"/>
+              <a:t>energia</a:t>
+            </a:r>
+          </a:p>
+          <a:p>
+            <a:pPr lvl="1" algn="just"/>
+            <a:r>
+              <a:rPr lang="pt-BR" dirty="0" smtClean="0"/>
+              <a:t>Os humanos </a:t>
+            </a:r>
+            <a:r>
+              <a:rPr lang="pt-BR" dirty="0"/>
+              <a:t>caçam lobos por diversão (e, perdem energia</a:t>
+            </a:r>
+            <a:r>
+              <a:rPr lang="pt-BR" dirty="0" smtClean="0"/>
+              <a:t>)</a:t>
+            </a:r>
+          </a:p>
+          <a:p>
+            <a:pPr lvl="2" algn="just"/>
+            <a:r>
+              <a:rPr lang="pt-BR" dirty="0" smtClean="0"/>
+              <a:t>Porém</a:t>
+            </a:r>
+            <a:r>
+              <a:rPr lang="pt-BR" dirty="0"/>
+              <a:t>, se a energia do humano for baixa e não existir nenhuma ovelha na vizinhança, o humano mata o lobo para comer e, consequentemente, aumenta sua </a:t>
+            </a:r>
+            <a:r>
+              <a:rPr lang="pt-BR" dirty="0" smtClean="0"/>
+              <a:t>energia </a:t>
+            </a:r>
+          </a:p>
+          <a:p>
+            <a:pPr lvl="1" algn="just"/>
+            <a:r>
+              <a:rPr lang="pt-BR" dirty="0" smtClean="0"/>
+              <a:t>Os </a:t>
+            </a:r>
+            <a:r>
+              <a:rPr lang="pt-BR" dirty="0"/>
+              <a:t>agentes conseguem matar outros agentes quando estes estiverem na vizinhança (analisando 8 vizinhos - vizinhança de Moore</a:t>
+            </a:r>
+            <a:r>
+              <a:rPr lang="pt-BR" dirty="0" smtClean="0"/>
+              <a:t>)</a:t>
+            </a:r>
+          </a:p>
+          <a:p>
+            <a:pPr lvl="1" algn="just"/>
+            <a:r>
+              <a:rPr lang="pt-BR" dirty="0" smtClean="0"/>
+              <a:t>A </a:t>
+            </a:r>
+            <a:r>
+              <a:rPr lang="pt-BR" dirty="0"/>
+              <a:t>cada </a:t>
+            </a:r>
+            <a:r>
+              <a:rPr lang="pt-BR" i="1" dirty="0" err="1"/>
+              <a:t>tick</a:t>
+            </a:r>
+            <a:r>
+              <a:rPr lang="pt-BR" dirty="0"/>
+              <a:t> os agentes se movimentam no ambiente e perdem 1 unidade de energia, quando essa energia chega a 0, o agente morre e sai da </a:t>
+            </a:r>
+            <a:r>
+              <a:rPr lang="pt-BR" dirty="0" smtClean="0"/>
+              <a:t>simulação</a:t>
+            </a:r>
+            <a:endParaRPr lang="pt-BR" dirty="0"/>
+          </a:p>
+        </p:txBody>
+      </p:sp>
+    </p:spTree>
+    <p:extLst>
+      <p:ext uri="{BB962C8B-B14F-4D97-AF65-F5344CB8AC3E}">
+        <p14:creationId xmlns:p14="http://schemas.microsoft.com/office/powerpoint/2010/main" val="1930868261"/>
+      </p:ext>
+    </p:extLst>
+  </p:cSld>
+  <p:clrMapOvr>
+    <a:masterClrMapping/>
+  </p:clrMapOvr>
+  <p:timing>
+    <p:tnLst>
+      <p:par>
+        <p:cTn id="1" dur="indefinite" restart="never" nodeType="tmRoot"/>
+      </p:par>
+    </p:tnLst>
+  </p:timing>
 </p:sld>
 </file>
 

</xml_diff>